<commit_message>
move resources to part 4, add slide on export and import in part 1
</commit_message>
<xml_diff>
--- a/part1/Introduction-to-FMI.pptx
+++ b/part1/Introduction-to-FMI.pptx
@@ -37,10 +37,10 @@
     <p:sldId id="461" r:id="rId27"/>
     <p:sldId id="463" r:id="rId28"/>
     <p:sldId id="462" r:id="rId29"/>
-    <p:sldId id="458" r:id="rId30"/>
-    <p:sldId id="466" r:id="rId31"/>
-    <p:sldId id="474" r:id="rId32"/>
-    <p:sldId id="471" r:id="rId33"/>
+    <p:sldId id="466" r:id="rId30"/>
+    <p:sldId id="474" r:id="rId31"/>
+    <p:sldId id="471" r:id="rId32"/>
+    <p:sldId id="476" r:id="rId33"/>
   </p:sldIdLst>
   <p:sldSz cx="12192000" cy="6858000"/>
   <p:notesSz cx="6858000" cy="9144000"/>
@@ -444,7 +444,7 @@
               <a:pPr>
                 <a:defRPr/>
               </a:pPr>
-              <a:t>‹#›</a:t>
+              <a:t>‹Nr.›</a:t>
             </a:fld>
             <a:endParaRPr lang="de-DE" altLang="en-US"/>
           </a:p>
@@ -581,7 +581,7 @@
               <a:pPr>
                 <a:defRPr/>
               </a:pPr>
-              <a:t>10/25/2023</a:t>
+              <a:t>6/23/2024</a:t>
             </a:fld>
             <a:endParaRPr lang="en-US"/>
           </a:p>
@@ -789,7 +789,7 @@
               <a:pPr>
                 <a:defRPr/>
               </a:pPr>
-              <a:t>‹#›</a:t>
+              <a:t>‹Nr.›</a:t>
             </a:fld>
             <a:endParaRPr lang="en-US" altLang="en-US"/>
           </a:p>
@@ -1296,7 +1296,7 @@
                   <a:srgbClr val="5E676E"/>
                 </a:solidFill>
               </a:rPr>
-              <a:t>© 2023 FMI Modelica Association Project | www.fmi-standard.org</a:t>
+              <a:t>© 2024 FMI Modelica Association Project | www.fmi-standard.org</a:t>
             </a:r>
           </a:p>
         </p:txBody>
@@ -2358,7 +2358,7 @@
             <a:fld id="{4898AEC0-503E-4FA4-859C-D0F72D6E3F79}" type="slidenum">
               <a:rPr lang="en-US" noProof="1" smtClean="0"/>
               <a:pPr/>
-              <a:t>‹#›</a:t>
+              <a:t>‹Nr.›</a:t>
             </a:fld>
             <a:endParaRPr lang="en-US" noProof="1"/>
           </a:p>
@@ -2770,7 +2770,7 @@
                   <a:srgbClr val="C00000"/>
                 </a:solidFill>
               </a:rPr>
-              <a:t>© 2023 Modelica Association Project FMI | www.fmi-standard.org</a:t>
+              <a:t>© 2024 Modelica Association Project FMI | www.fmi-standard.org</a:t>
             </a:r>
           </a:p>
         </p:txBody>
@@ -2951,7 +2951,7 @@
                 </a:spcBef>
                 <a:defRPr/>
               </a:pPr>
-              <a:t>‹#›</a:t>
+              <a:t>‹Nr.›</a:t>
             </a:fld>
             <a:endParaRPr lang="de-DE" altLang="en-US" sz="1000" dirty="0">
               <a:solidFill>
@@ -14363,321 +14363,6 @@
 <file path=ppt/slides/slide27.xml><?xml version="1.0" encoding="utf-8"?>
 <p:sld xmlns:a="http://schemas.openxmlformats.org/drawingml/2006/main" xmlns:r="http://schemas.openxmlformats.org/officeDocument/2006/relationships" xmlns:p="http://schemas.openxmlformats.org/presentationml/2006/main">
   <p:cSld>
-    <p:spTree>
-      <p:nvGrpSpPr>
-        <p:cNvPr id="1" name=""/>
-        <p:cNvGrpSpPr/>
-        <p:nvPr/>
-      </p:nvGrpSpPr>
-      <p:grpSpPr>
-        <a:xfrm>
-          <a:off x="0" y="0"/>
-          <a:ext cx="0" cy="0"/>
-          <a:chOff x="0" y="0"/>
-          <a:chExt cx="0" cy="0"/>
-        </a:xfrm>
-      </p:grpSpPr>
-      <p:sp>
-        <p:nvSpPr>
-          <p:cNvPr id="2" name="Content Placeholder 1">
-            <a:extLst>
-              <a:ext uri="{FF2B5EF4-FFF2-40B4-BE49-F238E27FC236}">
-                <a16:creationId xmlns:a16="http://schemas.microsoft.com/office/drawing/2014/main" id="{3FEB1448-A606-356D-21CD-EB85865D2B8E}"/>
-              </a:ext>
-            </a:extLst>
-          </p:cNvPr>
-          <p:cNvSpPr>
-            <a:spLocks noGrp="1"/>
-          </p:cNvSpPr>
-          <p:nvPr>
-            <p:ph idx="1"/>
-          </p:nvPr>
-        </p:nvSpPr>
-        <p:spPr>
-          <a:xfrm>
-            <a:off x="656973" y="1609754"/>
-            <a:ext cx="11003744" cy="4760007"/>
-          </a:xfrm>
-        </p:spPr>
-        <p:txBody>
-          <a:bodyPr/>
-          <a:lstStyle/>
-          <a:p>
-            <a:pPr marL="342900" indent="-342900">
-              <a:buFont typeface="Wingdings" panose="05000000000000000000" pitchFamily="2" charset="2"/>
-              <a:buChar char="§"/>
-            </a:pPr>
-            <a:r>
-              <a:rPr lang="en-US" dirty="0">
-                <a:hlinkClick r:id="rId2"/>
-              </a:rPr>
-              <a:t>FMI Webpage</a:t>
-            </a:r>
-            <a:endParaRPr lang="en-US" dirty="0"/>
-          </a:p>
-          <a:p>
-            <a:pPr marL="608013" lvl="1" indent="-342900"/>
-            <a:r>
-              <a:rPr lang="en-US" dirty="0">
-                <a:hlinkClick r:id="rId2"/>
-              </a:rPr>
-              <a:t>FMI tools list</a:t>
-            </a:r>
-            <a:endParaRPr lang="en-US" dirty="0"/>
-          </a:p>
-          <a:p>
-            <a:pPr marL="608013" lvl="1" indent="-342900"/>
-            <a:r>
-              <a:rPr lang="en-US" dirty="0">
-                <a:hlinkClick r:id="rId3"/>
-              </a:rPr>
-              <a:t>FMU validation</a:t>
-            </a:r>
-            <a:endParaRPr lang="en-US" dirty="0"/>
-          </a:p>
-          <a:p>
-            <a:pPr marL="608013" lvl="1" indent="-342900"/>
-            <a:r>
-              <a:rPr lang="en-US" dirty="0">
-                <a:hlinkClick r:id="rId4"/>
-              </a:rPr>
-              <a:t>Publications</a:t>
-            </a:r>
-            <a:endParaRPr lang="en-US" dirty="0"/>
-          </a:p>
-          <a:p>
-            <a:endParaRPr lang="en-US" dirty="0"/>
-          </a:p>
-          <a:p>
-            <a:pPr marL="342900" indent="-342900">
-              <a:buFont typeface="Wingdings" panose="05000000000000000000" pitchFamily="2" charset="2"/>
-              <a:buChar char="§"/>
-            </a:pPr>
-            <a:r>
-              <a:rPr lang="en-US" dirty="0">
-                <a:hlinkClick r:id="rId5"/>
-              </a:rPr>
-              <a:t>Reference FMUs</a:t>
-            </a:r>
-            <a:endParaRPr lang="en-US" dirty="0"/>
-          </a:p>
-          <a:p>
-            <a:pPr marL="608013" lvl="1" indent="-342900"/>
-            <a:r>
-              <a:rPr lang="en-US" dirty="0"/>
-              <a:t>A set of hand-coded FMUs for development, testing and debugging of FMI.</a:t>
-            </a:r>
-          </a:p>
-          <a:p>
-            <a:endParaRPr lang="en-US" dirty="0"/>
-          </a:p>
-          <a:p>
-            <a:pPr marL="342900" indent="-342900">
-              <a:buFont typeface="Wingdings" panose="05000000000000000000" pitchFamily="2" charset="2"/>
-              <a:buChar char="§"/>
-            </a:pPr>
-            <a:r>
-              <a:rPr lang="en-US" dirty="0"/>
-              <a:t>In case of questions we recommend to use </a:t>
-            </a:r>
-            <a:r>
-              <a:rPr lang="en-US" dirty="0" err="1">
-                <a:hlinkClick r:id="rId6"/>
-              </a:rPr>
-              <a:t>StackOverflow</a:t>
-            </a:r>
-            <a:r>
-              <a:rPr lang="en-US" dirty="0">
-                <a:hlinkClick r:id="rId6"/>
-              </a:rPr>
-              <a:t> with tag „</a:t>
-            </a:r>
-            <a:r>
-              <a:rPr lang="en-US" dirty="0" err="1">
-                <a:hlinkClick r:id="rId6"/>
-              </a:rPr>
-              <a:t>fmi</a:t>
-            </a:r>
-            <a:r>
-              <a:rPr lang="en-US" dirty="0">
-                <a:hlinkClick r:id="rId6"/>
-              </a:rPr>
-              <a:t>“ </a:t>
-            </a:r>
-            <a:endParaRPr lang="en-US" dirty="0"/>
-          </a:p>
-          <a:p>
-            <a:pPr marL="342900" indent="-342900">
-              <a:buFont typeface="Wingdings" panose="05000000000000000000" pitchFamily="2" charset="2"/>
-              <a:buChar char="§"/>
-            </a:pPr>
-            <a:r>
-              <a:rPr lang="en-US" dirty="0"/>
-              <a:t>You are welcome to join the (unofficial) </a:t>
-            </a:r>
-            <a:r>
-              <a:rPr lang="en-US" dirty="0">
-                <a:hlinkClick r:id="rId7"/>
-              </a:rPr>
-              <a:t>FMI LinkedIn Group</a:t>
-            </a:r>
-            <a:endParaRPr lang="en-US" dirty="0"/>
-          </a:p>
-          <a:p>
-            <a:endParaRPr lang="en-US" dirty="0"/>
-          </a:p>
-          <a:p>
-            <a:endParaRPr lang="en-US" dirty="0"/>
-          </a:p>
-        </p:txBody>
-      </p:sp>
-      <p:sp>
-        <p:nvSpPr>
-          <p:cNvPr id="3" name="Title 2">
-            <a:extLst>
-              <a:ext uri="{FF2B5EF4-FFF2-40B4-BE49-F238E27FC236}">
-                <a16:creationId xmlns:a16="http://schemas.microsoft.com/office/drawing/2014/main" id="{342E9CC4-362C-29FA-8245-5663A7F1F95C}"/>
-              </a:ext>
-            </a:extLst>
-          </p:cNvPr>
-          <p:cNvSpPr>
-            <a:spLocks noGrp="1"/>
-          </p:cNvSpPr>
-          <p:nvPr>
-            <p:ph type="title"/>
-          </p:nvPr>
-        </p:nvSpPr>
-        <p:spPr/>
-        <p:txBody>
-          <a:bodyPr/>
-          <a:lstStyle/>
-          <a:p>
-            <a:r>
-              <a:rPr lang="en-US" dirty="0"/>
-              <a:t>Resources</a:t>
-            </a:r>
-          </a:p>
-        </p:txBody>
-      </p:sp>
-      <p:pic>
-        <p:nvPicPr>
-          <p:cNvPr id="6" name="Picture 5">
-            <a:extLst>
-              <a:ext uri="{FF2B5EF4-FFF2-40B4-BE49-F238E27FC236}">
-                <a16:creationId xmlns:a16="http://schemas.microsoft.com/office/drawing/2014/main" id="{4022D0D8-DF6F-72F9-C17C-ECFEB0836533}"/>
-              </a:ext>
-            </a:extLst>
-          </p:cNvPr>
-          <p:cNvPicPr>
-            <a:picLocks noChangeAspect="1"/>
-          </p:cNvPicPr>
-          <p:nvPr/>
-        </p:nvPicPr>
-        <p:blipFill>
-          <a:blip r:embed="rId8"/>
-          <a:stretch>
-            <a:fillRect/>
-          </a:stretch>
-        </p:blipFill>
-        <p:spPr>
-          <a:xfrm>
-            <a:off x="5771530" y="1412081"/>
-            <a:ext cx="3350698" cy="1456162"/>
-          </a:xfrm>
-          <a:prstGeom prst="rect">
-            <a:avLst/>
-          </a:prstGeom>
-        </p:spPr>
-      </p:pic>
-      <p:pic>
-        <p:nvPicPr>
-          <p:cNvPr id="8" name="Picture 7">
-            <a:extLst>
-              <a:ext uri="{FF2B5EF4-FFF2-40B4-BE49-F238E27FC236}">
-                <a16:creationId xmlns:a16="http://schemas.microsoft.com/office/drawing/2014/main" id="{34E3B75B-E2CB-6176-0877-2D1D3F895820}"/>
-              </a:ext>
-            </a:extLst>
-          </p:cNvPr>
-          <p:cNvPicPr>
-            <a:picLocks noChangeAspect="1"/>
-          </p:cNvPicPr>
-          <p:nvPr/>
-        </p:nvPicPr>
-        <p:blipFill>
-          <a:blip r:embed="rId9">
-            <a:extLst>
-              <a:ext uri="{28A0092B-C50C-407E-A947-70E740481C1C}">
-                <a14:useLocalDpi xmlns:a14="http://schemas.microsoft.com/office/drawing/2010/main" val="0"/>
-              </a:ext>
-            </a:extLst>
-          </a:blip>
-          <a:stretch>
-            <a:fillRect/>
-          </a:stretch>
-        </p:blipFill>
-        <p:spPr>
-          <a:xfrm>
-            <a:off x="9369879" y="4472298"/>
-            <a:ext cx="1981364" cy="386132"/>
-          </a:xfrm>
-          <a:prstGeom prst="rect">
-            <a:avLst/>
-          </a:prstGeom>
-        </p:spPr>
-      </p:pic>
-      <p:pic>
-        <p:nvPicPr>
-          <p:cNvPr id="10" name="Picture 9">
-            <a:extLst>
-              <a:ext uri="{FF2B5EF4-FFF2-40B4-BE49-F238E27FC236}">
-                <a16:creationId xmlns:a16="http://schemas.microsoft.com/office/drawing/2014/main" id="{793D4B93-BCA7-B3CA-C487-6DB71A87A01D}"/>
-              </a:ext>
-            </a:extLst>
-          </p:cNvPr>
-          <p:cNvPicPr>
-            <a:picLocks noChangeAspect="1"/>
-          </p:cNvPicPr>
-          <p:nvPr/>
-        </p:nvPicPr>
-        <p:blipFill>
-          <a:blip r:embed="rId10">
-            <a:extLst>
-              <a:ext uri="{28A0092B-C50C-407E-A947-70E740481C1C}">
-                <a14:useLocalDpi xmlns:a14="http://schemas.microsoft.com/office/drawing/2010/main" val="0"/>
-              </a:ext>
-            </a:extLst>
-          </a:blip>
-          <a:stretch>
-            <a:fillRect/>
-          </a:stretch>
-        </p:blipFill>
-        <p:spPr>
-          <a:xfrm>
-            <a:off x="9369879" y="5056103"/>
-            <a:ext cx="501890" cy="501890"/>
-          </a:xfrm>
-          <a:prstGeom prst="rect">
-            <a:avLst/>
-          </a:prstGeom>
-        </p:spPr>
-      </p:pic>
-    </p:spTree>
-    <p:extLst>
-      <p:ext uri="{BB962C8B-B14F-4D97-AF65-F5344CB8AC3E}">
-        <p14:creationId xmlns:p14="http://schemas.microsoft.com/office/powerpoint/2010/main" val="2254098594"/>
-      </p:ext>
-    </p:extLst>
-  </p:cSld>
-  <p:clrMapOvr>
-    <a:masterClrMapping/>
-  </p:clrMapOvr>
-  <p:transition/>
-</p:sld>
-</file>
-
-<file path=ppt/slides/slide28.xml><?xml version="1.0" encoding="utf-8"?>
-<p:sld xmlns:a="http://schemas.openxmlformats.org/drawingml/2006/main" xmlns:r="http://schemas.openxmlformats.org/officeDocument/2006/relationships" xmlns:p="http://schemas.openxmlformats.org/presentationml/2006/main">
-  <p:cSld>
     <p:bg>
       <p:bgPr>
         <a:solidFill>
@@ -14774,7 +14459,7 @@
 </p:sld>
 </file>
 
-<file path=ppt/slides/slide29.xml><?xml version="1.0" encoding="utf-8"?>
+<file path=ppt/slides/slide28.xml><?xml version="1.0" encoding="utf-8"?>
 <p:sld xmlns:a="http://schemas.openxmlformats.org/drawingml/2006/main" xmlns:r="http://schemas.openxmlformats.org/officeDocument/2006/relationships" xmlns:p="http://schemas.openxmlformats.org/presentationml/2006/main">
   <p:cSld>
     <p:spTree>
@@ -15193,329 +14878,7 @@
 </p:sld>
 </file>
 
-<file path=ppt/slides/slide3.xml><?xml version="1.0" encoding="utf-8"?>
-<p:sld xmlns:a="http://schemas.openxmlformats.org/drawingml/2006/main" xmlns:r="http://schemas.openxmlformats.org/officeDocument/2006/relationships" xmlns:p="http://schemas.openxmlformats.org/presentationml/2006/main">
-  <p:cSld>
-    <p:spTree>
-      <p:nvGrpSpPr>
-        <p:cNvPr id="1" name=""/>
-        <p:cNvGrpSpPr/>
-        <p:nvPr/>
-      </p:nvGrpSpPr>
-      <p:grpSpPr>
-        <a:xfrm>
-          <a:off x="0" y="0"/>
-          <a:ext cx="0" cy="0"/>
-          <a:chOff x="0" y="0"/>
-          <a:chExt cx="0" cy="0"/>
-        </a:xfrm>
-      </p:grpSpPr>
-      <p:sp>
-        <p:nvSpPr>
-          <p:cNvPr id="5" name="Inhaltsplatzhalter 4">
-            <a:extLst>
-              <a:ext uri="{FF2B5EF4-FFF2-40B4-BE49-F238E27FC236}">
-                <a16:creationId xmlns:a16="http://schemas.microsoft.com/office/drawing/2014/main" id="{67430165-842A-5F14-A591-01F55A119BD9}"/>
-              </a:ext>
-            </a:extLst>
-          </p:cNvPr>
-          <p:cNvSpPr>
-            <a:spLocks noGrp="1"/>
-          </p:cNvSpPr>
-          <p:nvPr>
-            <p:ph idx="1"/>
-          </p:nvPr>
-        </p:nvSpPr>
-        <p:spPr/>
-        <p:txBody>
-          <a:bodyPr/>
-          <a:lstStyle/>
-          <a:p>
-            <a:r>
-              <a:rPr lang="en-US" sz="4000" b="1" dirty="0"/>
-              <a:t>Introduction to FMI</a:t>
-            </a:r>
-            <a:endParaRPr lang="en-US" dirty="0"/>
-          </a:p>
-        </p:txBody>
-      </p:sp>
-      <p:sp>
-        <p:nvSpPr>
-          <p:cNvPr id="4" name="Titel 3">
-            <a:extLst>
-              <a:ext uri="{FF2B5EF4-FFF2-40B4-BE49-F238E27FC236}">
-                <a16:creationId xmlns:a16="http://schemas.microsoft.com/office/drawing/2014/main" id="{B1C8FE56-2E01-097C-45C4-D3BC2A5ADD27}"/>
-              </a:ext>
-            </a:extLst>
-          </p:cNvPr>
-          <p:cNvSpPr>
-            <a:spLocks noGrp="1"/>
-          </p:cNvSpPr>
-          <p:nvPr>
-            <p:ph type="title"/>
-          </p:nvPr>
-        </p:nvSpPr>
-        <p:spPr/>
-        <p:txBody>
-          <a:bodyPr/>
-          <a:lstStyle/>
-          <a:p>
-            <a:r>
-              <a:rPr lang="en-US" dirty="0"/>
-              <a:t> </a:t>
-            </a:r>
-          </a:p>
-        </p:txBody>
-      </p:sp>
-      <p:pic>
-        <p:nvPicPr>
-          <p:cNvPr id="2" name="Picture 4">
-            <a:extLst>
-              <a:ext uri="{FF2B5EF4-FFF2-40B4-BE49-F238E27FC236}">
-                <a16:creationId xmlns:a16="http://schemas.microsoft.com/office/drawing/2014/main" id="{C6F665E4-16E4-89B7-F29E-C5589A9A5087}"/>
-              </a:ext>
-            </a:extLst>
-          </p:cNvPr>
-          <p:cNvPicPr>
-            <a:picLocks noChangeAspect="1"/>
-          </p:cNvPicPr>
-          <p:nvPr/>
-        </p:nvPicPr>
-        <p:blipFill>
-          <a:blip r:embed="rId2">
-            <a:extLst>
-              <a:ext uri="{28A0092B-C50C-407E-A947-70E740481C1C}">
-                <a14:useLocalDpi xmlns:a14="http://schemas.microsoft.com/office/drawing/2010/main" val="0"/>
-              </a:ext>
-            </a:extLst>
-          </a:blip>
-          <a:stretch>
-            <a:fillRect/>
-          </a:stretch>
-        </p:blipFill>
-        <p:spPr>
-          <a:xfrm>
-            <a:off x="620184" y="3130345"/>
-            <a:ext cx="5818812" cy="2378376"/>
-          </a:xfrm>
-          <a:prstGeom prst="rect">
-            <a:avLst/>
-          </a:prstGeom>
-        </p:spPr>
-      </p:pic>
-      <p:sp>
-        <p:nvSpPr>
-          <p:cNvPr id="3" name="TextBox 2">
-            <a:extLst>
-              <a:ext uri="{FF2B5EF4-FFF2-40B4-BE49-F238E27FC236}">
-                <a16:creationId xmlns:a16="http://schemas.microsoft.com/office/drawing/2014/main" id="{D9B8BF98-CDEA-294F-5A40-BA21B6EEF1E0}"/>
-              </a:ext>
-            </a:extLst>
-          </p:cNvPr>
-          <p:cNvSpPr txBox="1"/>
-          <p:nvPr/>
-        </p:nvSpPr>
-        <p:spPr>
-          <a:xfrm>
-            <a:off x="664119" y="2022364"/>
-            <a:ext cx="4823460" cy="646331"/>
-          </a:xfrm>
-          <a:prstGeom prst="rect">
-            <a:avLst/>
-          </a:prstGeom>
-          <a:noFill/>
-        </p:spPr>
-        <p:txBody>
-          <a:bodyPr wrap="square" rtlCol="0">
-            <a:spAutoFit/>
-          </a:bodyPr>
-          <a:lstStyle/>
-          <a:p>
-            <a:r>
-              <a:rPr lang="en-US" sz="1800" dirty="0">
-                <a:solidFill>
-                  <a:srgbClr val="5E676E"/>
-                </a:solidFill>
-                <a:latin typeface="+mn-lt"/>
-                <a:cs typeface="+mn-cs"/>
-              </a:rPr>
-              <a:t>Presenter:</a:t>
-            </a:r>
-            <a:br>
-              <a:rPr lang="en-US" sz="1800" dirty="0">
-                <a:solidFill>
-                  <a:srgbClr val="5E676E"/>
-                </a:solidFill>
-                <a:latin typeface="+mn-lt"/>
-                <a:cs typeface="+mn-cs"/>
-              </a:rPr>
-            </a:br>
-            <a:r>
-              <a:rPr lang="en-US" sz="1800" dirty="0">
-                <a:solidFill>
-                  <a:srgbClr val="5E676E"/>
-                </a:solidFill>
-                <a:latin typeface="+mn-lt"/>
-                <a:cs typeface="+mn-cs"/>
-              </a:rPr>
-              <a:t>Christian Bertsch, Bosch Research</a:t>
-            </a:r>
-          </a:p>
-        </p:txBody>
-      </p:sp>
-      <p:sp>
-        <p:nvSpPr>
-          <p:cNvPr id="6" name="TextBox 5">
-            <a:extLst>
-              <a:ext uri="{FF2B5EF4-FFF2-40B4-BE49-F238E27FC236}">
-                <a16:creationId xmlns:a16="http://schemas.microsoft.com/office/drawing/2014/main" id="{1C191A8C-B997-C22E-3072-39C605B73BD1}"/>
-              </a:ext>
-            </a:extLst>
-          </p:cNvPr>
-          <p:cNvSpPr txBox="1"/>
-          <p:nvPr/>
-        </p:nvSpPr>
-        <p:spPr>
-          <a:xfrm>
-            <a:off x="7388793" y="4510734"/>
-            <a:ext cx="4823460" cy="369332"/>
-          </a:xfrm>
-          <a:prstGeom prst="rect">
-            <a:avLst/>
-          </a:prstGeom>
-          <a:noFill/>
-        </p:spPr>
-        <p:txBody>
-          <a:bodyPr wrap="square" rtlCol="0">
-            <a:spAutoFit/>
-          </a:bodyPr>
-          <a:lstStyle/>
-          <a:p>
-            <a:r>
-              <a:rPr lang="en-US" sz="1800" dirty="0">
-                <a:solidFill>
-                  <a:srgbClr val="5E676E"/>
-                </a:solidFill>
-                <a:latin typeface="+mn-lt"/>
-                <a:cs typeface="+mn-cs"/>
-              </a:rPr>
-              <a:t>Online Materials:</a:t>
-            </a:r>
-          </a:p>
-        </p:txBody>
-      </p:sp>
-      <p:pic>
-        <p:nvPicPr>
-          <p:cNvPr id="8" name="Graphic 7">
-            <a:extLst>
-              <a:ext uri="{FF2B5EF4-FFF2-40B4-BE49-F238E27FC236}">
-                <a16:creationId xmlns:a16="http://schemas.microsoft.com/office/drawing/2014/main" id="{FF6468FD-CC0D-E690-2B25-B9AD706860FE}"/>
-              </a:ext>
-            </a:extLst>
-          </p:cNvPr>
-          <p:cNvPicPr>
-            <a:picLocks noChangeAspect="1"/>
-          </p:cNvPicPr>
-          <p:nvPr/>
-        </p:nvPicPr>
-        <p:blipFill>
-          <a:blip r:embed="rId3">
-            <a:extLst>
-              <a:ext uri="{28A0092B-C50C-407E-A947-70E740481C1C}">
-                <a14:useLocalDpi xmlns:a14="http://schemas.microsoft.com/office/drawing/2010/main" val="0"/>
-              </a:ext>
-              <a:ext uri="{96DAC541-7B7A-43D3-8B79-37D633B846F1}">
-                <asvg:svgBlip xmlns:asvg="http://schemas.microsoft.com/office/drawing/2016/SVG/main" r:embed="rId4"/>
-              </a:ext>
-            </a:extLst>
-          </a:blip>
-          <a:stretch>
-            <a:fillRect/>
-          </a:stretch>
-        </p:blipFill>
-        <p:spPr>
-          <a:xfrm>
-            <a:off x="9179492" y="2553145"/>
-            <a:ext cx="2488371" cy="2488371"/>
-          </a:xfrm>
-          <a:prstGeom prst="rect">
-            <a:avLst/>
-          </a:prstGeom>
-        </p:spPr>
-      </p:pic>
-      <p:sp>
-        <p:nvSpPr>
-          <p:cNvPr id="9" name="TextBox 8">
-            <a:extLst>
-              <a:ext uri="{FF2B5EF4-FFF2-40B4-BE49-F238E27FC236}">
-                <a16:creationId xmlns:a16="http://schemas.microsoft.com/office/drawing/2014/main" id="{9C374ED7-37BC-CF14-19AD-109D8F85F307}"/>
-              </a:ext>
-            </a:extLst>
-          </p:cNvPr>
-          <p:cNvSpPr txBox="1"/>
-          <p:nvPr/>
-        </p:nvSpPr>
-        <p:spPr>
-          <a:xfrm>
-            <a:off x="7388793" y="4880066"/>
-            <a:ext cx="4823460" cy="923330"/>
-          </a:xfrm>
-          <a:prstGeom prst="rect">
-            <a:avLst/>
-          </a:prstGeom>
-          <a:noFill/>
-        </p:spPr>
-        <p:txBody>
-          <a:bodyPr wrap="square" rtlCol="0">
-            <a:spAutoFit/>
-          </a:bodyPr>
-          <a:lstStyle/>
-          <a:p>
-            <a:r>
-              <a:rPr lang="en-US" sz="1800" dirty="0">
-                <a:solidFill>
-                  <a:srgbClr val="5E676E"/>
-                </a:solidFill>
-                <a:latin typeface="+mn-lt"/>
-                <a:cs typeface="+mn-cs"/>
-                <a:hlinkClick r:id="rId5"/>
-              </a:rPr>
-              <a:t>https://github.com/modelica/fmi-beginners-tutorial-2023/tree/main</a:t>
-            </a:r>
-            <a:endParaRPr lang="en-US" sz="1800" dirty="0">
-              <a:solidFill>
-                <a:srgbClr val="5E676E"/>
-              </a:solidFill>
-              <a:latin typeface="+mn-lt"/>
-              <a:cs typeface="+mn-cs"/>
-            </a:endParaRPr>
-          </a:p>
-          <a:p>
-            <a:endParaRPr lang="en-US" sz="1800" dirty="0">
-              <a:solidFill>
-                <a:srgbClr val="5E676E"/>
-              </a:solidFill>
-              <a:latin typeface="+mn-lt"/>
-              <a:cs typeface="+mn-cs"/>
-            </a:endParaRPr>
-          </a:p>
-        </p:txBody>
-      </p:sp>
-    </p:spTree>
-    <p:extLst>
-      <p:ext uri="{BB962C8B-B14F-4D97-AF65-F5344CB8AC3E}">
-        <p14:creationId xmlns:p14="http://schemas.microsoft.com/office/powerpoint/2010/main" val="3567263522"/>
-      </p:ext>
-    </p:extLst>
-  </p:cSld>
-  <p:clrMapOvr>
-    <a:masterClrMapping/>
-  </p:clrMapOvr>
-  <p:transition/>
-</p:sld>
-</file>
-
-<file path=ppt/slides/slide30.xml><?xml version="1.0" encoding="utf-8"?>
+<file path=ppt/slides/slide29.xml><?xml version="1.0" encoding="utf-8"?>
 <p:sld xmlns:a="http://schemas.openxmlformats.org/drawingml/2006/main" xmlns:r="http://schemas.openxmlformats.org/officeDocument/2006/relationships" xmlns:p="http://schemas.openxmlformats.org/presentationml/2006/main">
   <p:cSld>
     <p:spTree>
@@ -16985,6 +16348,574 @@
       <p:bldP spid="13" grpId="0" animBg="1"/>
     </p:bldLst>
   </p:timing>
+</p:sld>
+</file>
+
+<file path=ppt/slides/slide3.xml><?xml version="1.0" encoding="utf-8"?>
+<p:sld xmlns:a="http://schemas.openxmlformats.org/drawingml/2006/main" xmlns:r="http://schemas.openxmlformats.org/officeDocument/2006/relationships" xmlns:p="http://schemas.openxmlformats.org/presentationml/2006/main">
+  <p:cSld>
+    <p:spTree>
+      <p:nvGrpSpPr>
+        <p:cNvPr id="1" name=""/>
+        <p:cNvGrpSpPr/>
+        <p:nvPr/>
+      </p:nvGrpSpPr>
+      <p:grpSpPr>
+        <a:xfrm>
+          <a:off x="0" y="0"/>
+          <a:ext cx="0" cy="0"/>
+          <a:chOff x="0" y="0"/>
+          <a:chExt cx="0" cy="0"/>
+        </a:xfrm>
+      </p:grpSpPr>
+      <p:sp>
+        <p:nvSpPr>
+          <p:cNvPr id="5" name="Inhaltsplatzhalter 4">
+            <a:extLst>
+              <a:ext uri="{FF2B5EF4-FFF2-40B4-BE49-F238E27FC236}">
+                <a16:creationId xmlns:a16="http://schemas.microsoft.com/office/drawing/2014/main" id="{67430165-842A-5F14-A591-01F55A119BD9}"/>
+              </a:ext>
+            </a:extLst>
+          </p:cNvPr>
+          <p:cNvSpPr>
+            <a:spLocks noGrp="1"/>
+          </p:cNvSpPr>
+          <p:nvPr>
+            <p:ph idx="1"/>
+          </p:nvPr>
+        </p:nvSpPr>
+        <p:spPr/>
+        <p:txBody>
+          <a:bodyPr/>
+          <a:lstStyle/>
+          <a:p>
+            <a:r>
+              <a:rPr lang="en-US" sz="4000" b="1" dirty="0"/>
+              <a:t>Introduction to FMI</a:t>
+            </a:r>
+            <a:endParaRPr lang="en-US" dirty="0"/>
+          </a:p>
+        </p:txBody>
+      </p:sp>
+      <p:sp>
+        <p:nvSpPr>
+          <p:cNvPr id="4" name="Titel 3">
+            <a:extLst>
+              <a:ext uri="{FF2B5EF4-FFF2-40B4-BE49-F238E27FC236}">
+                <a16:creationId xmlns:a16="http://schemas.microsoft.com/office/drawing/2014/main" id="{B1C8FE56-2E01-097C-45C4-D3BC2A5ADD27}"/>
+              </a:ext>
+            </a:extLst>
+          </p:cNvPr>
+          <p:cNvSpPr>
+            <a:spLocks noGrp="1"/>
+          </p:cNvSpPr>
+          <p:nvPr>
+            <p:ph type="title"/>
+          </p:nvPr>
+        </p:nvSpPr>
+        <p:spPr/>
+        <p:txBody>
+          <a:bodyPr/>
+          <a:lstStyle/>
+          <a:p>
+            <a:r>
+              <a:rPr lang="en-US" dirty="0"/>
+              <a:t> </a:t>
+            </a:r>
+          </a:p>
+        </p:txBody>
+      </p:sp>
+      <p:pic>
+        <p:nvPicPr>
+          <p:cNvPr id="2" name="Picture 4">
+            <a:extLst>
+              <a:ext uri="{FF2B5EF4-FFF2-40B4-BE49-F238E27FC236}">
+                <a16:creationId xmlns:a16="http://schemas.microsoft.com/office/drawing/2014/main" id="{C6F665E4-16E4-89B7-F29E-C5589A9A5087}"/>
+              </a:ext>
+            </a:extLst>
+          </p:cNvPr>
+          <p:cNvPicPr>
+            <a:picLocks noChangeAspect="1"/>
+          </p:cNvPicPr>
+          <p:nvPr/>
+        </p:nvPicPr>
+        <p:blipFill>
+          <a:blip r:embed="rId2">
+            <a:extLst>
+              <a:ext uri="{28A0092B-C50C-407E-A947-70E740481C1C}">
+                <a14:useLocalDpi xmlns:a14="http://schemas.microsoft.com/office/drawing/2010/main" val="0"/>
+              </a:ext>
+            </a:extLst>
+          </a:blip>
+          <a:stretch>
+            <a:fillRect/>
+          </a:stretch>
+        </p:blipFill>
+        <p:spPr>
+          <a:xfrm>
+            <a:off x="620184" y="3130345"/>
+            <a:ext cx="5818812" cy="2378376"/>
+          </a:xfrm>
+          <a:prstGeom prst="rect">
+            <a:avLst/>
+          </a:prstGeom>
+        </p:spPr>
+      </p:pic>
+      <p:sp>
+        <p:nvSpPr>
+          <p:cNvPr id="3" name="TextBox 2">
+            <a:extLst>
+              <a:ext uri="{FF2B5EF4-FFF2-40B4-BE49-F238E27FC236}">
+                <a16:creationId xmlns:a16="http://schemas.microsoft.com/office/drawing/2014/main" id="{D9B8BF98-CDEA-294F-5A40-BA21B6EEF1E0}"/>
+              </a:ext>
+            </a:extLst>
+          </p:cNvPr>
+          <p:cNvSpPr txBox="1"/>
+          <p:nvPr/>
+        </p:nvSpPr>
+        <p:spPr>
+          <a:xfrm>
+            <a:off x="664119" y="2022364"/>
+            <a:ext cx="4823460" cy="646331"/>
+          </a:xfrm>
+          <a:prstGeom prst="rect">
+            <a:avLst/>
+          </a:prstGeom>
+          <a:noFill/>
+        </p:spPr>
+        <p:txBody>
+          <a:bodyPr wrap="square" rtlCol="0">
+            <a:spAutoFit/>
+          </a:bodyPr>
+          <a:lstStyle/>
+          <a:p>
+            <a:r>
+              <a:rPr lang="en-US" sz="1800" dirty="0">
+                <a:solidFill>
+                  <a:srgbClr val="5E676E"/>
+                </a:solidFill>
+                <a:latin typeface="+mn-lt"/>
+                <a:cs typeface="+mn-cs"/>
+              </a:rPr>
+              <a:t>Presenter:</a:t>
+            </a:r>
+            <a:br>
+              <a:rPr lang="en-US" sz="1800" dirty="0">
+                <a:solidFill>
+                  <a:srgbClr val="5E676E"/>
+                </a:solidFill>
+                <a:latin typeface="+mn-lt"/>
+                <a:cs typeface="+mn-cs"/>
+              </a:rPr>
+            </a:br>
+            <a:r>
+              <a:rPr lang="en-US" sz="1800" dirty="0">
+                <a:solidFill>
+                  <a:srgbClr val="5E676E"/>
+                </a:solidFill>
+                <a:latin typeface="+mn-lt"/>
+                <a:cs typeface="+mn-cs"/>
+              </a:rPr>
+              <a:t>Christian Bertsch, Bosch Research</a:t>
+            </a:r>
+          </a:p>
+        </p:txBody>
+      </p:sp>
+      <p:sp>
+        <p:nvSpPr>
+          <p:cNvPr id="6" name="TextBox 5">
+            <a:extLst>
+              <a:ext uri="{FF2B5EF4-FFF2-40B4-BE49-F238E27FC236}">
+                <a16:creationId xmlns:a16="http://schemas.microsoft.com/office/drawing/2014/main" id="{1C191A8C-B997-C22E-3072-39C605B73BD1}"/>
+              </a:ext>
+            </a:extLst>
+          </p:cNvPr>
+          <p:cNvSpPr txBox="1"/>
+          <p:nvPr/>
+        </p:nvSpPr>
+        <p:spPr>
+          <a:xfrm>
+            <a:off x="7388793" y="4510734"/>
+            <a:ext cx="4823460" cy="369332"/>
+          </a:xfrm>
+          <a:prstGeom prst="rect">
+            <a:avLst/>
+          </a:prstGeom>
+          <a:noFill/>
+        </p:spPr>
+        <p:txBody>
+          <a:bodyPr wrap="square" rtlCol="0">
+            <a:spAutoFit/>
+          </a:bodyPr>
+          <a:lstStyle/>
+          <a:p>
+            <a:r>
+              <a:rPr lang="en-US" sz="1800" dirty="0">
+                <a:solidFill>
+                  <a:srgbClr val="5E676E"/>
+                </a:solidFill>
+                <a:latin typeface="+mn-lt"/>
+                <a:cs typeface="+mn-cs"/>
+              </a:rPr>
+              <a:t>Online Materials:</a:t>
+            </a:r>
+          </a:p>
+        </p:txBody>
+      </p:sp>
+      <p:pic>
+        <p:nvPicPr>
+          <p:cNvPr id="8" name="Graphic 7">
+            <a:extLst>
+              <a:ext uri="{FF2B5EF4-FFF2-40B4-BE49-F238E27FC236}">
+                <a16:creationId xmlns:a16="http://schemas.microsoft.com/office/drawing/2014/main" id="{FF6468FD-CC0D-E690-2B25-B9AD706860FE}"/>
+              </a:ext>
+            </a:extLst>
+          </p:cNvPr>
+          <p:cNvPicPr>
+            <a:picLocks noChangeAspect="1"/>
+          </p:cNvPicPr>
+          <p:nvPr/>
+        </p:nvPicPr>
+        <p:blipFill>
+          <a:blip r:embed="rId3">
+            <a:extLst>
+              <a:ext uri="{28A0092B-C50C-407E-A947-70E740481C1C}">
+                <a14:useLocalDpi xmlns:a14="http://schemas.microsoft.com/office/drawing/2010/main" val="0"/>
+              </a:ext>
+              <a:ext uri="{96DAC541-7B7A-43D3-8B79-37D633B846F1}">
+                <asvg:svgBlip xmlns:asvg="http://schemas.microsoft.com/office/drawing/2016/SVG/main" r:embed="rId4"/>
+              </a:ext>
+            </a:extLst>
+          </a:blip>
+          <a:stretch>
+            <a:fillRect/>
+          </a:stretch>
+        </p:blipFill>
+        <p:spPr>
+          <a:xfrm>
+            <a:off x="9179492" y="2553145"/>
+            <a:ext cx="2488371" cy="2488371"/>
+          </a:xfrm>
+          <a:prstGeom prst="rect">
+            <a:avLst/>
+          </a:prstGeom>
+        </p:spPr>
+      </p:pic>
+      <p:sp>
+        <p:nvSpPr>
+          <p:cNvPr id="9" name="TextBox 8">
+            <a:extLst>
+              <a:ext uri="{FF2B5EF4-FFF2-40B4-BE49-F238E27FC236}">
+                <a16:creationId xmlns:a16="http://schemas.microsoft.com/office/drawing/2014/main" id="{9C374ED7-37BC-CF14-19AD-109D8F85F307}"/>
+              </a:ext>
+            </a:extLst>
+          </p:cNvPr>
+          <p:cNvSpPr txBox="1"/>
+          <p:nvPr/>
+        </p:nvSpPr>
+        <p:spPr>
+          <a:xfrm>
+            <a:off x="7388793" y="4880066"/>
+            <a:ext cx="4823460" cy="923330"/>
+          </a:xfrm>
+          <a:prstGeom prst="rect">
+            <a:avLst/>
+          </a:prstGeom>
+          <a:noFill/>
+        </p:spPr>
+        <p:txBody>
+          <a:bodyPr wrap="square" rtlCol="0">
+            <a:spAutoFit/>
+          </a:bodyPr>
+          <a:lstStyle/>
+          <a:p>
+            <a:r>
+              <a:rPr lang="en-US" sz="1800" dirty="0">
+                <a:solidFill>
+                  <a:srgbClr val="5E676E"/>
+                </a:solidFill>
+                <a:latin typeface="+mn-lt"/>
+                <a:cs typeface="+mn-cs"/>
+                <a:hlinkClick r:id="rId5"/>
+              </a:rPr>
+              <a:t>https://github.com/modelica/fmi-beginners-tutorial-2023/tree/main</a:t>
+            </a:r>
+            <a:endParaRPr lang="en-US" sz="1800" dirty="0">
+              <a:solidFill>
+                <a:srgbClr val="5E676E"/>
+              </a:solidFill>
+              <a:latin typeface="+mn-lt"/>
+              <a:cs typeface="+mn-cs"/>
+            </a:endParaRPr>
+          </a:p>
+          <a:p>
+            <a:endParaRPr lang="en-US" sz="1800" dirty="0">
+              <a:solidFill>
+                <a:srgbClr val="5E676E"/>
+              </a:solidFill>
+              <a:latin typeface="+mn-lt"/>
+              <a:cs typeface="+mn-cs"/>
+            </a:endParaRPr>
+          </a:p>
+        </p:txBody>
+      </p:sp>
+    </p:spTree>
+    <p:extLst>
+      <p:ext uri="{BB962C8B-B14F-4D97-AF65-F5344CB8AC3E}">
+        <p14:creationId xmlns:p14="http://schemas.microsoft.com/office/powerpoint/2010/main" val="3567263522"/>
+      </p:ext>
+    </p:extLst>
+  </p:cSld>
+  <p:clrMapOvr>
+    <a:masterClrMapping/>
+  </p:clrMapOvr>
+  <p:transition/>
+</p:sld>
+</file>
+
+<file path=ppt/slides/slide30.xml><?xml version="1.0" encoding="utf-8"?>
+<p:sld xmlns:a="http://schemas.openxmlformats.org/drawingml/2006/main" xmlns:r="http://schemas.openxmlformats.org/officeDocument/2006/relationships" xmlns:p="http://schemas.openxmlformats.org/presentationml/2006/main">
+  <p:cSld>
+    <p:spTree>
+      <p:nvGrpSpPr>
+        <p:cNvPr id="1" name=""/>
+        <p:cNvGrpSpPr/>
+        <p:nvPr/>
+      </p:nvGrpSpPr>
+      <p:grpSpPr>
+        <a:xfrm>
+          <a:off x="0" y="0"/>
+          <a:ext cx="0" cy="0"/>
+          <a:chOff x="0" y="0"/>
+          <a:chExt cx="0" cy="0"/>
+        </a:xfrm>
+      </p:grpSpPr>
+      <p:sp>
+        <p:nvSpPr>
+          <p:cNvPr id="2" name="Titel 1">
+            <a:extLst>
+              <a:ext uri="{FF2B5EF4-FFF2-40B4-BE49-F238E27FC236}">
+                <a16:creationId xmlns:a16="http://schemas.microsoft.com/office/drawing/2014/main" id="{A56BA5D5-B42C-CA6D-F3DD-BBF41C4722B0}"/>
+              </a:ext>
+            </a:extLst>
+          </p:cNvPr>
+          <p:cNvSpPr>
+            <a:spLocks noGrp="1"/>
+          </p:cNvSpPr>
+          <p:nvPr>
+            <p:ph type="title"/>
+          </p:nvPr>
+        </p:nvSpPr>
+        <p:spPr/>
+        <p:txBody>
+          <a:bodyPr/>
+          <a:lstStyle/>
+          <a:p>
+            <a:r>
+              <a:rPr lang="en-US" dirty="0"/>
+              <a:t>Demo: FMU Export and import</a:t>
+            </a:r>
+          </a:p>
+        </p:txBody>
+      </p:sp>
+      <p:sp>
+        <p:nvSpPr>
+          <p:cNvPr id="3" name="Textplatzhalter 2">
+            <a:extLst>
+              <a:ext uri="{FF2B5EF4-FFF2-40B4-BE49-F238E27FC236}">
+                <a16:creationId xmlns:a16="http://schemas.microsoft.com/office/drawing/2014/main" id="{03E7C848-94B3-D81D-EDA1-6754086CD2F5}"/>
+              </a:ext>
+            </a:extLst>
+          </p:cNvPr>
+          <p:cNvSpPr>
+            <a:spLocks noGrp="1"/>
+          </p:cNvSpPr>
+          <p:nvPr>
+            <p:ph type="body" sz="quarter" idx="15"/>
+          </p:nvPr>
+        </p:nvSpPr>
+        <p:spPr/>
+        <p:txBody>
+          <a:bodyPr/>
+          <a:lstStyle/>
+          <a:p>
+            <a:r>
+              <a:rPr lang="en-US" dirty="0"/>
+              <a:t> </a:t>
+            </a:r>
+          </a:p>
+        </p:txBody>
+      </p:sp>
+      <p:sp>
+        <p:nvSpPr>
+          <p:cNvPr id="4" name="Inhaltsplatzhalter 3">
+            <a:extLst>
+              <a:ext uri="{FF2B5EF4-FFF2-40B4-BE49-F238E27FC236}">
+                <a16:creationId xmlns:a16="http://schemas.microsoft.com/office/drawing/2014/main" id="{BD658E77-3930-B94E-6924-70431598A2C4}"/>
+              </a:ext>
+            </a:extLst>
+          </p:cNvPr>
+          <p:cNvSpPr>
+            <a:spLocks noGrp="1"/>
+          </p:cNvSpPr>
+          <p:nvPr>
+            <p:ph sz="quarter" idx="1"/>
+          </p:nvPr>
+        </p:nvSpPr>
+        <p:spPr/>
+        <p:txBody>
+          <a:bodyPr/>
+          <a:lstStyle/>
+          <a:p>
+            <a:r>
+              <a:rPr lang="en-US" b="1" dirty="0"/>
+              <a:t>FMU Export</a:t>
+            </a:r>
+            <a:r>
+              <a:rPr lang="en-US" dirty="0"/>
+              <a:t> from Modelica-tool Dymola: </a:t>
+            </a:r>
+          </a:p>
+          <a:p>
+            <a:pPr>
+              <a:buFont typeface="Wingdings" panose="05000000000000000000" pitchFamily="2" charset="2"/>
+              <a:buChar char="§"/>
+            </a:pPr>
+            <a:r>
+              <a:rPr lang="en-US" dirty="0"/>
+              <a:t>Configure options</a:t>
+            </a:r>
+          </a:p>
+          <a:p>
+            <a:pPr>
+              <a:buFont typeface="Wingdings" panose="05000000000000000000" pitchFamily="2" charset="2"/>
+              <a:buChar char="§"/>
+            </a:pPr>
+            <a:endParaRPr lang="en-US" dirty="0"/>
+          </a:p>
+          <a:p>
+            <a:pPr>
+              <a:buFont typeface="Wingdings" panose="05000000000000000000" pitchFamily="2" charset="2"/>
+              <a:buChar char="§"/>
+            </a:pPr>
+            <a:endParaRPr lang="en-US" dirty="0"/>
+          </a:p>
+          <a:p>
+            <a:pPr>
+              <a:buFont typeface="Wingdings" panose="05000000000000000000" pitchFamily="2" charset="2"/>
+              <a:buChar char="§"/>
+            </a:pPr>
+            <a:endParaRPr lang="en-US" dirty="0"/>
+          </a:p>
+          <a:p>
+            <a:pPr marL="0" indent="0"/>
+            <a:r>
+              <a:rPr lang="en-US" b="1" dirty="0"/>
+              <a:t>FMU Import and </a:t>
+            </a:r>
+            <a:r>
+              <a:rPr lang="en-US" b="1" dirty="0" err="1"/>
+              <a:t>Simulionat</a:t>
+            </a:r>
+            <a:r>
+              <a:rPr lang="en-US" b="1" dirty="0"/>
+              <a:t> </a:t>
+            </a:r>
+            <a:r>
+              <a:rPr lang="en-US" dirty="0"/>
+              <a:t>in Dymola: </a:t>
+            </a:r>
+          </a:p>
+          <a:p>
+            <a:pPr marL="0" indent="0"/>
+            <a:endParaRPr lang="en-US" dirty="0"/>
+          </a:p>
+          <a:p>
+            <a:pPr>
+              <a:buFont typeface="Wingdings" panose="05000000000000000000" pitchFamily="2" charset="2"/>
+              <a:buChar char="§"/>
+            </a:pPr>
+            <a:endParaRPr lang="en-US" dirty="0"/>
+          </a:p>
+          <a:p>
+            <a:pPr>
+              <a:buFont typeface="Wingdings" panose="05000000000000000000" pitchFamily="2" charset="2"/>
+              <a:buChar char="§"/>
+            </a:pPr>
+            <a:endParaRPr lang="en-US" dirty="0"/>
+          </a:p>
+        </p:txBody>
+      </p:sp>
+      <p:pic>
+        <p:nvPicPr>
+          <p:cNvPr id="6" name="Grafik 5">
+            <a:extLst>
+              <a:ext uri="{FF2B5EF4-FFF2-40B4-BE49-F238E27FC236}">
+                <a16:creationId xmlns:a16="http://schemas.microsoft.com/office/drawing/2014/main" id="{07B85533-9D91-D54D-1103-1ADF7C0760FD}"/>
+              </a:ext>
+            </a:extLst>
+          </p:cNvPr>
+          <p:cNvPicPr>
+            <a:picLocks noChangeAspect="1"/>
+          </p:cNvPicPr>
+          <p:nvPr/>
+        </p:nvPicPr>
+        <p:blipFill>
+          <a:blip r:embed="rId2"/>
+          <a:stretch>
+            <a:fillRect/>
+          </a:stretch>
+        </p:blipFill>
+        <p:spPr>
+          <a:xfrm>
+            <a:off x="8185628" y="1152296"/>
+            <a:ext cx="3165545" cy="3604955"/>
+          </a:xfrm>
+          <a:prstGeom prst="rect">
+            <a:avLst/>
+          </a:prstGeom>
+        </p:spPr>
+      </p:pic>
+      <p:pic>
+        <p:nvPicPr>
+          <p:cNvPr id="8" name="Grafik 7">
+            <a:extLst>
+              <a:ext uri="{FF2B5EF4-FFF2-40B4-BE49-F238E27FC236}">
+                <a16:creationId xmlns:a16="http://schemas.microsoft.com/office/drawing/2014/main" id="{4BB61C4D-FF49-2EFD-CE04-8E312F0E46C7}"/>
+              </a:ext>
+            </a:extLst>
+          </p:cNvPr>
+          <p:cNvPicPr>
+            <a:picLocks noChangeAspect="1"/>
+          </p:cNvPicPr>
+          <p:nvPr/>
+        </p:nvPicPr>
+        <p:blipFill>
+          <a:blip r:embed="rId3"/>
+          <a:stretch>
+            <a:fillRect/>
+          </a:stretch>
+        </p:blipFill>
+        <p:spPr>
+          <a:xfrm>
+            <a:off x="1642922" y="3796976"/>
+            <a:ext cx="5127851" cy="2084808"/>
+          </a:xfrm>
+          <a:prstGeom prst="rect">
+            <a:avLst/>
+          </a:prstGeom>
+        </p:spPr>
+      </p:pic>
+    </p:spTree>
+    <p:extLst>
+      <p:ext uri="{BB962C8B-B14F-4D97-AF65-F5344CB8AC3E}">
+        <p14:creationId xmlns:p14="http://schemas.microsoft.com/office/powerpoint/2010/main" val="1653237753"/>
+      </p:ext>
+    </p:extLst>
+  </p:cSld>
+  <p:clrMapOvr>
+    <a:masterClrMapping/>
+  </p:clrMapOvr>
 </p:sld>
 </file>
 
@@ -20468,6 +20399,12 @@
 </file>
 
 <file path=customXml/item1.xml><?xml version="1.0" encoding="utf-8"?>
+<p:properties xmlns:p="http://schemas.microsoft.com/office/2006/metadata/properties" xmlns:xsi="http://www.w3.org/2001/XMLSchema-instance" xmlns:pc="http://schemas.microsoft.com/office/infopath/2007/PartnerControls">
+  <documentManagement/>
+</p:properties>
+</file>
+
+<file path=customXml/item2.xml><?xml version="1.0" encoding="utf-8"?>
 <ct:contentTypeSchema xmlns:ct="http://schemas.microsoft.com/office/2006/metadata/contentType" xmlns:ma="http://schemas.microsoft.com/office/2006/metadata/properties/metaAttributes" ct:_="" ma:_="" ma:contentTypeName="Document" ma:contentTypeID="0x0101004E5FCAD8E6222F478CF98AE6458717E4" ma:contentTypeVersion="0" ma:contentTypeDescription="Create a new document." ma:contentTypeScope="" ma:versionID="ae4c969974cdc097ec4092e4953e579e">
   <xsd:schema xmlns:xsd="http://www.w3.org/2001/XMLSchema" xmlns:p="http://schemas.microsoft.com/office/2006/metadata/properties" targetNamespace="http://schemas.microsoft.com/office/2006/metadata/properties" ma:root="true" ma:fieldsID="9684e7e44b4b32ae9d4fdaa413507a5d">
     <xsd:element name="properties">
@@ -20516,13 +20453,22 @@
 </ct:contentTypeSchema>
 </file>
 
-<file path=customXml/item2.xml><?xml version="1.0" encoding="utf-8"?>
-<p:properties xmlns:p="http://schemas.microsoft.com/office/2006/metadata/properties" xmlns:xsi="http://www.w3.org/2001/XMLSchema-instance" xmlns:pc="http://schemas.microsoft.com/office/infopath/2007/PartnerControls">
-  <documentManagement/>
-</p:properties>
+<file path=customXml/itemProps1.xml><?xml version="1.0" encoding="utf-8"?>
+<ds:datastoreItem xmlns:ds="http://schemas.openxmlformats.org/officeDocument/2006/customXml" ds:itemID="{2605D1E8-C791-4C95-A083-CBF3AF871BEC}">
+  <ds:schemaRefs>
+    <ds:schemaRef ds:uri="http://purl.org/dc/terms/"/>
+    <ds:schemaRef ds:uri="http://purl.org/dc/elements/1.1/"/>
+    <ds:schemaRef ds:uri="http://schemas.openxmlformats.org/package/2006/metadata/core-properties"/>
+    <ds:schemaRef ds:uri="http://schemas.microsoft.com/office/2006/documentManagement/types"/>
+    <ds:schemaRef ds:uri="http://schemas.microsoft.com/office/2006/metadata/properties"/>
+    <ds:schemaRef ds:uri="http://www.w3.org/XML/1998/namespace"/>
+    <ds:schemaRef ds:uri="http://purl.org/dc/dcmitype/"/>
+    <ds:schemaRef ds:uri="http://schemas.microsoft.com/office/infopath/2007/PartnerControls"/>
+  </ds:schemaRefs>
+</ds:datastoreItem>
 </file>
 
-<file path=customXml/itemProps1.xml><?xml version="1.0" encoding="utf-8"?>
+<file path=customXml/itemProps2.xml><?xml version="1.0" encoding="utf-8"?>
 <ds:datastoreItem xmlns:ds="http://schemas.openxmlformats.org/officeDocument/2006/customXml" ds:itemID="{D6DDF4F8-48B7-40A7-A044-30F13F7F87CD}">
   <ds:schemaRefs>
     <ds:schemaRef ds:uri="http://schemas.microsoft.com/office/2006/metadata/contentType"/>
@@ -20535,19 +20481,4 @@
     <ds:schemaRef ds:uri="http://schemas.microsoft.com/office/internal/2005/internalDocumentation"/>
   </ds:schemaRefs>
 </ds:datastoreItem>
-</file>
-
-<file path=customXml/itemProps2.xml><?xml version="1.0" encoding="utf-8"?>
-<ds:datastoreItem xmlns:ds="http://schemas.openxmlformats.org/officeDocument/2006/customXml" ds:itemID="{2605D1E8-C791-4C95-A083-CBF3AF871BEC}">
-  <ds:schemaRefs>
-    <ds:schemaRef ds:uri="http://purl.org/dc/terms/"/>
-    <ds:schemaRef ds:uri="http://purl.org/dc/elements/1.1/"/>
-    <ds:schemaRef ds:uri="http://schemas.openxmlformats.org/package/2006/metadata/core-properties"/>
-    <ds:schemaRef ds:uri="http://schemas.microsoft.com/office/2006/documentManagement/types"/>
-    <ds:schemaRef ds:uri="http://schemas.microsoft.com/office/2006/metadata/properties"/>
-    <ds:schemaRef ds:uri="http://www.w3.org/XML/1998/namespace"/>
-    <ds:schemaRef ds:uri="http://purl.org/dc/dcmitype/"/>
-    <ds:schemaRef ds:uri="http://schemas.microsoft.com/office/infopath/2007/PartnerControls"/>
-  </ds:schemaRefs>
-</ds:datastoreItem>
 </file>
</xml_diff>